<commit_message>
merged PBI example into O365 example
</commit_message>
<xml_diff>
--- a/Presentation-PSHSummit2023-NoVideo.pptx
+++ b/Presentation-PSHSummit2023-NoVideo.pptx
@@ -176,16 +176,32 @@
 </p:presentation>
 </file>
 
-<file path=ppt/revisionInfo.xml><?xml version="1.0" encoding="utf-8"?>
-<p1510:revInfo xmlns:a="http://schemas.openxmlformats.org/drawingml/2006/main" xmlns:r="http://schemas.openxmlformats.org/officeDocument/2006/relationships" xmlns:p1510="http://schemas.microsoft.com/office/powerpoint/2015/10/main">
-  <p1510:revLst>
-    <p1510:client id="{A3962EED-ABA8-4EB1-9163-F76B7800A94B}" v="42" dt="2023-05-03T23:53:32.936"/>
-  </p1510:revLst>
-</p1510:revInfo>
-</file>
-
 <file path=ppt/changesInfos/changesInfo1.xml><?xml version="1.0" encoding="utf-8"?>
 <pc:chgInfo xmlns:a="http://schemas.openxmlformats.org/drawingml/2006/main" xmlns:r="http://schemas.openxmlformats.org/officeDocument/2006/relationships" xmlns:ac="http://schemas.microsoft.com/office/drawing/2013/main/command" xmlns:pc="http://schemas.microsoft.com/office/powerpoint/2013/main/command">
+  <pc:docChgLst>
+    <pc:chgData name="Mike Soule" userId="9fd0a5c4b3bf1bb1" providerId="LiveId" clId="{7DC97A7F-7160-43AE-A103-802A440E5673}"/>
+    <pc:docChg chg="custSel modSld">
+      <pc:chgData name="Mike Soule" userId="9fd0a5c4b3bf1bb1" providerId="LiveId" clId="{7DC97A7F-7160-43AE-A103-802A440E5673}" dt="2023-05-30T13:30:11.424" v="0" actId="478"/>
+      <pc:docMkLst>
+        <pc:docMk/>
+      </pc:docMkLst>
+      <pc:sldChg chg="delSp mod">
+        <pc:chgData name="Mike Soule" userId="9fd0a5c4b3bf1bb1" providerId="LiveId" clId="{7DC97A7F-7160-43AE-A103-802A440E5673}" dt="2023-05-30T13:30:11.424" v="0" actId="478"/>
+        <pc:sldMkLst>
+          <pc:docMk/>
+          <pc:sldMk cId="671384436" sldId="273"/>
+        </pc:sldMkLst>
+        <pc:spChg chg="del">
+          <ac:chgData name="Mike Soule" userId="9fd0a5c4b3bf1bb1" providerId="LiveId" clId="{7DC97A7F-7160-43AE-A103-802A440E5673}" dt="2023-05-30T13:30:11.424" v="0" actId="478"/>
+          <ac:spMkLst>
+            <pc:docMk/>
+            <pc:sldMk cId="671384436" sldId="273"/>
+            <ac:spMk id="13" creationId="{014FD63C-5681-CA60-0C4F-F4D7839567E3}"/>
+          </ac:spMkLst>
+        </pc:spChg>
+      </pc:sldChg>
+    </pc:docChg>
+  </pc:docChgLst>
   <pc:docChgLst>
     <pc:chgData name="Mike Soule" userId="9fd0a5c4b3bf1bb1" providerId="LiveId" clId="{A3962EED-ABA8-4EB1-9163-F76B7800A94B}"/>
     <pc:docChg chg="undo custSel delSld modSld">
@@ -493,7 +509,7 @@
           <a:p>
             <a:fld id="{62CF2DC4-392E-48ED-97F2-135EC7E14E8B}" type="datetimeFigureOut">
               <a:rPr lang="en-US" smtClean="0"/>
-              <a:t>5/3/2023</a:t>
+              <a:t>5/30/2023</a:t>
             </a:fld>
             <a:endParaRPr lang="en-US"/>
           </a:p>
@@ -21256,60 +21272,6 @@
           </a:p>
         </p:txBody>
       </p:sp>
-      <p:sp>
-        <p:nvSpPr>
-          <p:cNvPr id="13" name="Rectangle 12">
-            <a:extLst>
-              <a:ext uri="{FF2B5EF4-FFF2-40B4-BE49-F238E27FC236}">
-                <a16:creationId xmlns:a16="http://schemas.microsoft.com/office/drawing/2014/main" id="{014FD63C-5681-CA60-0C4F-F4D7839567E3}"/>
-              </a:ext>
-            </a:extLst>
-          </p:cNvPr>
-          <p:cNvSpPr/>
-          <p:nvPr/>
-        </p:nvSpPr>
-        <p:spPr>
-          <a:xfrm>
-            <a:off x="76199" y="1166608"/>
-            <a:ext cx="12048393" cy="2719592"/>
-          </a:xfrm>
-          <a:prstGeom prst="rect">
-            <a:avLst/>
-          </a:prstGeom>
-          <a:solidFill>
-            <a:schemeClr val="bg1">
-              <a:alpha val="60000"/>
-            </a:schemeClr>
-          </a:solidFill>
-          <a:ln>
-            <a:noFill/>
-          </a:ln>
-        </p:spPr>
-        <p:style>
-          <a:lnRef idx="2">
-            <a:schemeClr val="accent1">
-              <a:shade val="50000"/>
-            </a:schemeClr>
-          </a:lnRef>
-          <a:fillRef idx="1">
-            <a:schemeClr val="accent1"/>
-          </a:fillRef>
-          <a:effectRef idx="0">
-            <a:schemeClr val="accent1"/>
-          </a:effectRef>
-          <a:fontRef idx="minor">
-            <a:schemeClr val="lt1"/>
-          </a:fontRef>
-        </p:style>
-        <p:txBody>
-          <a:bodyPr rtlCol="0" anchor="ctr"/>
-          <a:lstStyle/>
-          <a:p>
-            <a:pPr algn="ctr"/>
-            <a:endParaRPr lang="en-US"/>
-          </a:p>
-        </p:txBody>
-      </p:sp>
     </p:spTree>
     <p:extLst>
       <p:ext uri="{BB962C8B-B14F-4D97-AF65-F5344CB8AC3E}">
@@ -21881,6 +21843,12 @@
 </file>
 
 <file path=customXml/item2.xml><?xml version="1.0" encoding="utf-8"?>
+<p:properties xmlns:p="http://schemas.microsoft.com/office/2006/metadata/properties" xmlns:xsi="http://www.w3.org/2001/XMLSchema-instance" xmlns:pc="http://schemas.microsoft.com/office/infopath/2007/PartnerControls">
+  <documentManagement/>
+</p:properties>
+</file>
+
+<file path=customXml/item3.xml><?xml version="1.0" encoding="utf-8"?>
 <ct:contentTypeSchema xmlns:ct="http://schemas.microsoft.com/office/2006/metadata/contentType" xmlns:ma="http://schemas.microsoft.com/office/2006/metadata/properties/metaAttributes" ct:_="" ma:_="" ma:contentTypeName="Document" ma:contentTypeID="0x010100F4F7FF22093805478C1AC3DECA046AE2" ma:contentTypeVersion="8" ma:contentTypeDescription="Create a new document." ma:contentTypeScope="" ma:versionID="355f70b62edaa6431edc676a4e077378">
   <xsd:schema xmlns:xsd="http://www.w3.org/2001/XMLSchema" xmlns:xs="http://www.w3.org/2001/XMLSchema" xmlns:p="http://schemas.microsoft.com/office/2006/metadata/properties" xmlns:ns3="645951c4-77b2-4271-8f10-a0d3c1e36172" xmlns:ns4="4999cf13-cb53-4a3d-a90e-c2f6e51a4028" targetNamespace="http://schemas.microsoft.com/office/2006/metadata/properties" ma:root="true" ma:fieldsID="2227e73c82c8b7740b460282c33c29e7" ns3:_="" ns4:_="">
     <xsd:import namespace="645951c4-77b2-4271-8f10-a0d3c1e36172"/>
@@ -22071,12 +22039,6 @@
 </ct:contentTypeSchema>
 </file>
 
-<file path=customXml/item3.xml><?xml version="1.0" encoding="utf-8"?>
-<p:properties xmlns:p="http://schemas.microsoft.com/office/2006/metadata/properties" xmlns:xsi="http://www.w3.org/2001/XMLSchema-instance" xmlns:pc="http://schemas.microsoft.com/office/infopath/2007/PartnerControls">
-  <documentManagement/>
-</p:properties>
-</file>
-
 <file path=customXml/itemProps1.xml><?xml version="1.0" encoding="utf-8"?>
 <ds:datastoreItem xmlns:ds="http://schemas.openxmlformats.org/officeDocument/2006/customXml" ds:itemID="{0C22064C-1319-48D9-99A8-E6155754BCCB}">
   <ds:schemaRefs>
@@ -22086,6 +22048,23 @@
 </file>
 
 <file path=customXml/itemProps2.xml><?xml version="1.0" encoding="utf-8"?>
+<ds:datastoreItem xmlns:ds="http://schemas.openxmlformats.org/officeDocument/2006/customXml" ds:itemID="{92A6475F-74BE-49E2-AA53-D5190570A614}">
+  <ds:schemaRefs>
+    <ds:schemaRef ds:uri="http://purl.org/dc/dcmitype/"/>
+    <ds:schemaRef ds:uri="http://schemas.microsoft.com/office/2006/documentManagement/types"/>
+    <ds:schemaRef ds:uri="http://purl.org/dc/elements/1.1/"/>
+    <ds:schemaRef ds:uri="http://schemas.microsoft.com/office/infopath/2007/PartnerControls"/>
+    <ds:schemaRef ds:uri="http://schemas.openxmlformats.org/package/2006/metadata/core-properties"/>
+    <ds:schemaRef ds:uri="4999cf13-cb53-4a3d-a90e-c2f6e51a4028"/>
+    <ds:schemaRef ds:uri="645951c4-77b2-4271-8f10-a0d3c1e36172"/>
+    <ds:schemaRef ds:uri="http://schemas.microsoft.com/office/2006/metadata/properties"/>
+    <ds:schemaRef ds:uri="http://www.w3.org/XML/1998/namespace"/>
+    <ds:schemaRef ds:uri="http://purl.org/dc/terms/"/>
+  </ds:schemaRefs>
+</ds:datastoreItem>
+</file>
+
+<file path=customXml/itemProps3.xml><?xml version="1.0" encoding="utf-8"?>
 <ds:datastoreItem xmlns:ds="http://schemas.openxmlformats.org/officeDocument/2006/customXml" ds:itemID="{7B8DF68D-5FB3-440F-B135-BC13D85A75AA}">
   <ds:schemaRefs>
     <ds:schemaRef ds:uri="4999cf13-cb53-4a3d-a90e-c2f6e51a4028"/>
@@ -22102,21 +22081,4 @@
     <ds:schemaRef ds:uri="http://www.w3.org/2001/XMLSchema"/>
   </ds:schemaRefs>
 </ds:datastoreItem>
-</file>
-
-<file path=customXml/itemProps3.xml><?xml version="1.0" encoding="utf-8"?>
-<ds:datastoreItem xmlns:ds="http://schemas.openxmlformats.org/officeDocument/2006/customXml" ds:itemID="{92A6475F-74BE-49E2-AA53-D5190570A614}">
-  <ds:schemaRefs>
-    <ds:schemaRef ds:uri="http://purl.org/dc/dcmitype/"/>
-    <ds:schemaRef ds:uri="http://schemas.microsoft.com/office/2006/documentManagement/types"/>
-    <ds:schemaRef ds:uri="http://purl.org/dc/elements/1.1/"/>
-    <ds:schemaRef ds:uri="http://schemas.microsoft.com/office/infopath/2007/PartnerControls"/>
-    <ds:schemaRef ds:uri="http://schemas.openxmlformats.org/package/2006/metadata/core-properties"/>
-    <ds:schemaRef ds:uri="4999cf13-cb53-4a3d-a90e-c2f6e51a4028"/>
-    <ds:schemaRef ds:uri="645951c4-77b2-4271-8f10-a0d3c1e36172"/>
-    <ds:schemaRef ds:uri="http://schemas.microsoft.com/office/2006/metadata/properties"/>
-    <ds:schemaRef ds:uri="http://www.w3.org/XML/1998/namespace"/>
-    <ds:schemaRef ds:uri="http://purl.org/dc/terms/"/>
-  </ds:schemaRefs>
-</ds:datastoreItem>
 </file>
</xml_diff>